<commit_message>
add ref in ppt
</commit_message>
<xml_diff>
--- a/papers/DatasetInfo_chenhangting.pptx
+++ b/papers/DatasetInfo_chenhangting.pptx
@@ -13,6 +13,7 @@
     <p:sldId id="263" r:id="rId7"/>
     <p:sldId id="264" r:id="rId8"/>
     <p:sldId id="261" r:id="rId9"/>
+    <p:sldId id="265" r:id="rId10"/>
   </p:sldIdLst>
   <p:sldSz cx="9144000" cy="6858000" type="screen4x3"/>
   <p:notesSz cx="6858000" cy="9144000"/>
@@ -250,7 +251,7 @@
           <a:p>
             <a:fld id="{2B05A5FC-E278-471B-A10C-37C1410986D1}" type="datetimeFigureOut">
               <a:rPr lang="zh-CN" altLang="en-US" smtClean="0"/>
-              <a:t>2018/4/14</a:t>
+              <a:t>2018/4/22</a:t>
             </a:fld>
             <a:endParaRPr lang="zh-CN" altLang="en-US"/>
           </a:p>
@@ -427,7 +428,7 @@
           <a:p>
             <a:fld id="{2B05A5FC-E278-471B-A10C-37C1410986D1}" type="datetimeFigureOut">
               <a:rPr lang="zh-CN" altLang="en-US" smtClean="0"/>
-              <a:t>2018/4/14</a:t>
+              <a:t>2018/4/22</a:t>
             </a:fld>
             <a:endParaRPr lang="zh-CN" altLang="en-US"/>
           </a:p>
@@ -607,7 +608,7 @@
           <a:p>
             <a:fld id="{2B05A5FC-E278-471B-A10C-37C1410986D1}" type="datetimeFigureOut">
               <a:rPr lang="zh-CN" altLang="en-US" smtClean="0"/>
-              <a:t>2018/4/14</a:t>
+              <a:t>2018/4/22</a:t>
             </a:fld>
             <a:endParaRPr lang="zh-CN" altLang="en-US"/>
           </a:p>
@@ -777,7 +778,7 @@
           <a:p>
             <a:fld id="{2B05A5FC-E278-471B-A10C-37C1410986D1}" type="datetimeFigureOut">
               <a:rPr lang="zh-CN" altLang="en-US" smtClean="0"/>
-              <a:t>2018/4/14</a:t>
+              <a:t>2018/4/22</a:t>
             </a:fld>
             <a:endParaRPr lang="zh-CN" altLang="en-US"/>
           </a:p>
@@ -1021,7 +1022,7 @@
           <a:p>
             <a:fld id="{2B05A5FC-E278-471B-A10C-37C1410986D1}" type="datetimeFigureOut">
               <a:rPr lang="zh-CN" altLang="en-US" smtClean="0"/>
-              <a:t>2018/4/14</a:t>
+              <a:t>2018/4/22</a:t>
             </a:fld>
             <a:endParaRPr lang="zh-CN" altLang="en-US"/>
           </a:p>
@@ -1253,7 +1254,7 @@
           <a:p>
             <a:fld id="{2B05A5FC-E278-471B-A10C-37C1410986D1}" type="datetimeFigureOut">
               <a:rPr lang="zh-CN" altLang="en-US" smtClean="0"/>
-              <a:t>2018/4/14</a:t>
+              <a:t>2018/4/22</a:t>
             </a:fld>
             <a:endParaRPr lang="zh-CN" altLang="en-US"/>
           </a:p>
@@ -1620,7 +1621,7 @@
           <a:p>
             <a:fld id="{2B05A5FC-E278-471B-A10C-37C1410986D1}" type="datetimeFigureOut">
               <a:rPr lang="zh-CN" altLang="en-US" smtClean="0"/>
-              <a:t>2018/4/14</a:t>
+              <a:t>2018/4/22</a:t>
             </a:fld>
             <a:endParaRPr lang="zh-CN" altLang="en-US"/>
           </a:p>
@@ -1738,7 +1739,7 @@
           <a:p>
             <a:fld id="{2B05A5FC-E278-471B-A10C-37C1410986D1}" type="datetimeFigureOut">
               <a:rPr lang="zh-CN" altLang="en-US" smtClean="0"/>
-              <a:t>2018/4/14</a:t>
+              <a:t>2018/4/22</a:t>
             </a:fld>
             <a:endParaRPr lang="zh-CN" altLang="en-US"/>
           </a:p>
@@ -1833,7 +1834,7 @@
           <a:p>
             <a:fld id="{2B05A5FC-E278-471B-A10C-37C1410986D1}" type="datetimeFigureOut">
               <a:rPr lang="zh-CN" altLang="en-US" smtClean="0"/>
-              <a:t>2018/4/14</a:t>
+              <a:t>2018/4/22</a:t>
             </a:fld>
             <a:endParaRPr lang="zh-CN" altLang="en-US"/>
           </a:p>
@@ -2110,7 +2111,7 @@
           <a:p>
             <a:fld id="{2B05A5FC-E278-471B-A10C-37C1410986D1}" type="datetimeFigureOut">
               <a:rPr lang="zh-CN" altLang="en-US" smtClean="0"/>
-              <a:t>2018/4/14</a:t>
+              <a:t>2018/4/22</a:t>
             </a:fld>
             <a:endParaRPr lang="zh-CN" altLang="en-US"/>
           </a:p>
@@ -2367,7 +2368,7 @@
           <a:p>
             <a:fld id="{2B05A5FC-E278-471B-A10C-37C1410986D1}" type="datetimeFigureOut">
               <a:rPr lang="zh-CN" altLang="en-US" smtClean="0"/>
-              <a:t>2018/4/14</a:t>
+              <a:t>2018/4/22</a:t>
             </a:fld>
             <a:endParaRPr lang="zh-CN" altLang="en-US"/>
           </a:p>
@@ -2580,7 +2581,7 @@
           <a:p>
             <a:fld id="{2B05A5FC-E278-471B-A10C-37C1410986D1}" type="datetimeFigureOut">
               <a:rPr lang="zh-CN" altLang="en-US" smtClean="0"/>
-              <a:t>2018/4/14</a:t>
+              <a:t>2018/4/22</a:t>
             </a:fld>
             <a:endParaRPr lang="zh-CN" altLang="en-US"/>
           </a:p>
@@ -3265,13 +3266,8 @@
                       </a:r>
                       <a:r>
                         <a:rPr lang="en-US" altLang="zh-CN" baseline="0" dirty="0" smtClean="0"/>
-                        <a:t> annotation</a:t>
-                      </a:r>
-                      <a:r>
-                        <a:rPr lang="en-US" altLang="zh-CN" baseline="0" dirty="0" smtClean="0"/>
-                        <a:t>;</a:t>
-                      </a:r>
-                      <a:endParaRPr lang="en-US" altLang="zh-CN" baseline="0" dirty="0" smtClean="0"/>
+                        <a:t> annotation;</a:t>
+                      </a:r>
                     </a:p>
                   </a:txBody>
                   <a:tcPr/>
@@ -4580,6 +4576,606 @@
 </p:sld>
 </file>
 
+<file path=ppt/slides/slide9.xml><?xml version="1.0" encoding="utf-8"?>
+<p:sld xmlns:a="http://schemas.openxmlformats.org/drawingml/2006/main" xmlns:r="http://schemas.openxmlformats.org/officeDocument/2006/relationships" xmlns:p="http://schemas.openxmlformats.org/presentationml/2006/main">
+  <p:cSld>
+    <p:spTree>
+      <p:nvGrpSpPr>
+        <p:cNvPr id="1" name=""/>
+        <p:cNvGrpSpPr/>
+        <p:nvPr/>
+      </p:nvGrpSpPr>
+      <p:grpSpPr>
+        <a:xfrm>
+          <a:off x="0" y="0"/>
+          <a:ext cx="0" cy="0"/>
+          <a:chOff x="0" y="0"/>
+          <a:chExt cx="0" cy="0"/>
+        </a:xfrm>
+      </p:grpSpPr>
+      <p:sp>
+        <p:nvSpPr>
+          <p:cNvPr id="2" name="标题 1"/>
+          <p:cNvSpPr>
+            <a:spLocks noGrp="1"/>
+          </p:cNvSpPr>
+          <p:nvPr>
+            <p:ph type="title"/>
+          </p:nvPr>
+        </p:nvSpPr>
+        <p:spPr/>
+        <p:txBody>
+          <a:bodyPr/>
+          <a:lstStyle/>
+          <a:p>
+            <a:r>
+              <a:rPr lang="en-US" altLang="zh-CN" dirty="0" smtClean="0"/>
+              <a:t>Ref</a:t>
+            </a:r>
+            <a:endParaRPr lang="zh-CN" altLang="en-US" dirty="0"/>
+          </a:p>
+        </p:txBody>
+      </p:sp>
+      <p:graphicFrame>
+        <p:nvGraphicFramePr>
+          <p:cNvPr id="4" name="内容占位符 3"/>
+          <p:cNvGraphicFramePr>
+            <a:graphicFrameLocks noGrp="1"/>
+          </p:cNvGraphicFramePr>
+          <p:nvPr>
+            <p:ph idx="1"/>
+            <p:extLst>
+              <p:ext uri="{D42A27DB-BD31-4B8C-83A1-F6EECF244321}">
+                <p14:modId xmlns:p14="http://schemas.microsoft.com/office/powerpoint/2010/main" val="2116802196"/>
+              </p:ext>
+            </p:extLst>
+          </p:nvPr>
+        </p:nvGraphicFramePr>
+        <p:xfrm>
+          <a:off x="845388" y="1457863"/>
+          <a:ext cx="6944264" cy="5080959"/>
+        </p:xfrm>
+        <a:graphic>
+          <a:graphicData uri="http://schemas.openxmlformats.org/drawingml/2006/table">
+            <a:tbl>
+              <a:tblPr/>
+              <a:tblGrid>
+                <a:gridCol w="3472132">
+                  <a:extLst>
+                    <a:ext uri="{9D8B030D-6E8A-4147-A177-3AD203B41FA5}">
+                      <a16:colId xmlns:a16="http://schemas.microsoft.com/office/drawing/2014/main" val="2793490760"/>
+                    </a:ext>
+                  </a:extLst>
+                </a:gridCol>
+                <a:gridCol w="3472132">
+                  <a:extLst>
+                    <a:ext uri="{9D8B030D-6E8A-4147-A177-3AD203B41FA5}">
+                      <a16:colId xmlns:a16="http://schemas.microsoft.com/office/drawing/2014/main" val="2513523923"/>
+                    </a:ext>
+                  </a:extLst>
+                </a:gridCol>
+              </a:tblGrid>
+              <a:tr h="320541">
+                <a:tc>
+                  <a:txBody>
+                    <a:bodyPr/>
+                    <a:lstStyle/>
+                    <a:p>
+                      <a:r>
+                        <a:rPr lang="en-US" sz="1600" b="1">
+                          <a:effectLst/>
+                        </a:rPr>
+                        <a:t>Dataset</a:t>
+                      </a:r>
+                    </a:p>
+                  </a:txBody>
+                  <a:tcPr marL="38016" marR="38016" marT="17546" marB="17546" anchor="ctr">
+                    <a:lnL w="7620" cap="flat" cmpd="sng" algn="ctr">
+                      <a:solidFill>
+                        <a:srgbClr val="DFE2E5"/>
+                      </a:solidFill>
+                      <a:prstDash val="solid"/>
+                      <a:round/>
+                      <a:headEnd type="none" w="med" len="med"/>
+                      <a:tailEnd type="none" w="med" len="med"/>
+                    </a:lnL>
+                    <a:lnR w="7620" cap="flat" cmpd="sng" algn="ctr">
+                      <a:solidFill>
+                        <a:srgbClr val="DFE2E5"/>
+                      </a:solidFill>
+                      <a:prstDash val="solid"/>
+                      <a:round/>
+                      <a:headEnd type="none" w="med" len="med"/>
+                      <a:tailEnd type="none" w="med" len="med"/>
+                    </a:lnR>
+                    <a:lnT w="7620" cap="flat" cmpd="sng" algn="ctr">
+                      <a:solidFill>
+                        <a:srgbClr val="DFE2E5"/>
+                      </a:solidFill>
+                      <a:prstDash val="solid"/>
+                      <a:round/>
+                      <a:headEnd type="none" w="med" len="med"/>
+                      <a:tailEnd type="none" w="med" len="med"/>
+                    </a:lnT>
+                    <a:lnB w="7620" cap="flat" cmpd="sng" algn="ctr">
+                      <a:solidFill>
+                        <a:srgbClr val="DFE2E5"/>
+                      </a:solidFill>
+                      <a:prstDash val="solid"/>
+                      <a:round/>
+                      <a:headEnd type="none" w="med" len="med"/>
+                      <a:tailEnd type="none" w="med" len="med"/>
+                    </a:lnB>
+                    <a:solidFill>
+                      <a:srgbClr val="FFFFFF"/>
+                    </a:solidFill>
+                  </a:tcPr>
+                </a:tc>
+                <a:tc>
+                  <a:txBody>
+                    <a:bodyPr/>
+                    <a:lstStyle/>
+                    <a:p>
+                      <a:r>
+                        <a:rPr lang="en-US" sz="1600" b="1">
+                          <a:effectLst/>
+                        </a:rPr>
+                        <a:t>Paper BibTeX</a:t>
+                      </a:r>
+                    </a:p>
+                  </a:txBody>
+                  <a:tcPr marL="38016" marR="38016" marT="17546" marB="17546" anchor="ctr">
+                    <a:lnL w="7620" cap="flat" cmpd="sng" algn="ctr">
+                      <a:solidFill>
+                        <a:srgbClr val="DFE2E5"/>
+                      </a:solidFill>
+                      <a:prstDash val="solid"/>
+                      <a:round/>
+                      <a:headEnd type="none" w="med" len="med"/>
+                      <a:tailEnd type="none" w="med" len="med"/>
+                    </a:lnL>
+                    <a:lnR w="7620" cap="flat" cmpd="sng" algn="ctr">
+                      <a:solidFill>
+                        <a:srgbClr val="DFE2E5"/>
+                      </a:solidFill>
+                      <a:prstDash val="solid"/>
+                      <a:round/>
+                      <a:headEnd type="none" w="med" len="med"/>
+                      <a:tailEnd type="none" w="med" len="med"/>
+                    </a:lnR>
+                    <a:lnT w="7620" cap="flat" cmpd="sng" algn="ctr">
+                      <a:solidFill>
+                        <a:srgbClr val="DFE2E5"/>
+                      </a:solidFill>
+                      <a:prstDash val="solid"/>
+                      <a:round/>
+                      <a:headEnd type="none" w="med" len="med"/>
+                      <a:tailEnd type="none" w="med" len="med"/>
+                    </a:lnT>
+                    <a:lnB w="7620" cap="flat" cmpd="sng" algn="ctr">
+                      <a:solidFill>
+                        <a:srgbClr val="DFE2E5"/>
+                      </a:solidFill>
+                      <a:prstDash val="solid"/>
+                      <a:round/>
+                      <a:headEnd type="none" w="med" len="med"/>
+                      <a:tailEnd type="none" w="med" len="med"/>
+                    </a:lnB>
+                    <a:solidFill>
+                      <a:srgbClr val="FFFFFF"/>
+                    </a:solidFill>
+                  </a:tcPr>
+                </a:tc>
+                <a:extLst>
+                  <a:ext uri="{0D108BD9-81ED-4DB2-BD59-A6C34878D82A}">
+                    <a16:rowId xmlns:a16="http://schemas.microsoft.com/office/drawing/2014/main" val="2002576015"/>
+                  </a:ext>
+                </a:extLst>
+              </a:tr>
+              <a:tr h="1269445">
+                <a:tc>
+                  <a:txBody>
+                    <a:bodyPr/>
+                    <a:lstStyle/>
+                    <a:p>
+                      <a:r>
+                        <a:rPr lang="en-US" sz="1600" dirty="0">
+                          <a:effectLst/>
+                        </a:rPr>
+                        <a:t>CMU-MOSI</a:t>
+                      </a:r>
+                    </a:p>
+                  </a:txBody>
+                  <a:tcPr marL="38016" marR="38016" marT="17546" marB="17546" anchor="ctr">
+                    <a:lnL w="7620" cap="flat" cmpd="sng" algn="ctr">
+                      <a:solidFill>
+                        <a:srgbClr val="DFE2E5"/>
+                      </a:solidFill>
+                      <a:prstDash val="solid"/>
+                      <a:round/>
+                      <a:headEnd type="none" w="med" len="med"/>
+                      <a:tailEnd type="none" w="med" len="med"/>
+                    </a:lnL>
+                    <a:lnR w="7620" cap="flat" cmpd="sng" algn="ctr">
+                      <a:solidFill>
+                        <a:srgbClr val="DFE2E5"/>
+                      </a:solidFill>
+                      <a:prstDash val="solid"/>
+                      <a:round/>
+                      <a:headEnd type="none" w="med" len="med"/>
+                      <a:tailEnd type="none" w="med" len="med"/>
+                    </a:lnR>
+                    <a:lnT w="7620" cap="flat" cmpd="sng" algn="ctr">
+                      <a:solidFill>
+                        <a:srgbClr val="DFE2E5"/>
+                      </a:solidFill>
+                      <a:prstDash val="solid"/>
+                      <a:round/>
+                      <a:headEnd type="none" w="med" len="med"/>
+                      <a:tailEnd type="none" w="med" len="med"/>
+                    </a:lnT>
+                    <a:lnB w="7620" cap="flat" cmpd="sng" algn="ctr">
+                      <a:solidFill>
+                        <a:srgbClr val="DFE2E5"/>
+                      </a:solidFill>
+                      <a:prstDash val="solid"/>
+                      <a:round/>
+                      <a:headEnd type="none" w="med" len="med"/>
+                      <a:tailEnd type="none" w="med" len="med"/>
+                    </a:lnB>
+                    <a:solidFill>
+                      <a:srgbClr val="F6F8FA"/>
+                    </a:solidFill>
+                  </a:tcPr>
+                </a:tc>
+                <a:tc>
+                  <a:txBody>
+                    <a:bodyPr/>
+                    <a:lstStyle/>
+                    <a:p>
+                      <a:r>
+                        <a:rPr lang="en-US" sz="1600">
+                          <a:effectLst/>
+                        </a:rPr>
+                        <a:t>Zadeh, Amir, et al. "Multimodal sentiment intensity analysis in videos: Facial gestures and verbal messages." IEEE Intelligent Systems 31.6 (2016): 82-88.</a:t>
+                      </a:r>
+                    </a:p>
+                  </a:txBody>
+                  <a:tcPr marL="38016" marR="38016" marT="17546" marB="17546" anchor="ctr">
+                    <a:lnL w="7620" cap="flat" cmpd="sng" algn="ctr">
+                      <a:solidFill>
+                        <a:srgbClr val="DFE2E5"/>
+                      </a:solidFill>
+                      <a:prstDash val="solid"/>
+                      <a:round/>
+                      <a:headEnd type="none" w="med" len="med"/>
+                      <a:tailEnd type="none" w="med" len="med"/>
+                    </a:lnL>
+                    <a:lnR w="7620" cap="flat" cmpd="sng" algn="ctr">
+                      <a:solidFill>
+                        <a:srgbClr val="DFE2E5"/>
+                      </a:solidFill>
+                      <a:prstDash val="solid"/>
+                      <a:round/>
+                      <a:headEnd type="none" w="med" len="med"/>
+                      <a:tailEnd type="none" w="med" len="med"/>
+                    </a:lnR>
+                    <a:lnT w="7620" cap="flat" cmpd="sng" algn="ctr">
+                      <a:solidFill>
+                        <a:srgbClr val="DFE2E5"/>
+                      </a:solidFill>
+                      <a:prstDash val="solid"/>
+                      <a:round/>
+                      <a:headEnd type="none" w="med" len="med"/>
+                      <a:tailEnd type="none" w="med" len="med"/>
+                    </a:lnT>
+                    <a:lnB w="7620" cap="flat" cmpd="sng" algn="ctr">
+                      <a:solidFill>
+                        <a:srgbClr val="DFE2E5"/>
+                      </a:solidFill>
+                      <a:prstDash val="solid"/>
+                      <a:round/>
+                      <a:headEnd type="none" w="med" len="med"/>
+                      <a:tailEnd type="none" w="med" len="med"/>
+                    </a:lnB>
+                    <a:solidFill>
+                      <a:srgbClr val="F6F8FA"/>
+                    </a:solidFill>
+                  </a:tcPr>
+                </a:tc>
+                <a:extLst>
+                  <a:ext uri="{0D108BD9-81ED-4DB2-BD59-A6C34878D82A}">
+                    <a16:rowId xmlns:a16="http://schemas.microsoft.com/office/drawing/2014/main" val="2352463859"/>
+                  </a:ext>
+                </a:extLst>
+              </a:tr>
+              <a:tr h="1269445">
+                <a:tc>
+                  <a:txBody>
+                    <a:bodyPr/>
+                    <a:lstStyle/>
+                    <a:p>
+                      <a:r>
+                        <a:rPr lang="en-US" sz="1600" dirty="0">
+                          <a:effectLst/>
+                        </a:rPr>
+                        <a:t>IEMOCAP</a:t>
+                      </a:r>
+                    </a:p>
+                  </a:txBody>
+                  <a:tcPr marL="38016" marR="38016" marT="17546" marB="17546" anchor="ctr">
+                    <a:lnL w="7620" cap="flat" cmpd="sng" algn="ctr">
+                      <a:solidFill>
+                        <a:srgbClr val="DFE2E5"/>
+                      </a:solidFill>
+                      <a:prstDash val="solid"/>
+                      <a:round/>
+                      <a:headEnd type="none" w="med" len="med"/>
+                      <a:tailEnd type="none" w="med" len="med"/>
+                    </a:lnL>
+                    <a:lnR w="7620" cap="flat" cmpd="sng" algn="ctr">
+                      <a:solidFill>
+                        <a:srgbClr val="DFE2E5"/>
+                      </a:solidFill>
+                      <a:prstDash val="solid"/>
+                      <a:round/>
+                      <a:headEnd type="none" w="med" len="med"/>
+                      <a:tailEnd type="none" w="med" len="med"/>
+                    </a:lnR>
+                    <a:lnT w="7620" cap="flat" cmpd="sng" algn="ctr">
+                      <a:solidFill>
+                        <a:srgbClr val="DFE2E5"/>
+                      </a:solidFill>
+                      <a:prstDash val="solid"/>
+                      <a:round/>
+                      <a:headEnd type="none" w="med" len="med"/>
+                      <a:tailEnd type="none" w="med" len="med"/>
+                    </a:lnT>
+                    <a:lnB w="7620" cap="flat" cmpd="sng" algn="ctr">
+                      <a:solidFill>
+                        <a:srgbClr val="DFE2E5"/>
+                      </a:solidFill>
+                      <a:prstDash val="solid"/>
+                      <a:round/>
+                      <a:headEnd type="none" w="med" len="med"/>
+                      <a:tailEnd type="none" w="med" len="med"/>
+                    </a:lnB>
+                    <a:solidFill>
+                      <a:srgbClr val="FFFFFF"/>
+                    </a:solidFill>
+                  </a:tcPr>
+                </a:tc>
+                <a:tc>
+                  <a:txBody>
+                    <a:bodyPr/>
+                    <a:lstStyle/>
+                    <a:p>
+                      <a:r>
+                        <a:rPr lang="en-US" sz="1600">
+                          <a:effectLst/>
+                        </a:rPr>
+                        <a:t>Busso, Carlos, et al. "IEMOCAP: Interactive emotional dyadic motion capture database." Language resources and evaluation 42.4 (2008): 335.</a:t>
+                      </a:r>
+                    </a:p>
+                  </a:txBody>
+                  <a:tcPr marL="38016" marR="38016" marT="17546" marB="17546" anchor="ctr">
+                    <a:lnL w="7620" cap="flat" cmpd="sng" algn="ctr">
+                      <a:solidFill>
+                        <a:srgbClr val="DFE2E5"/>
+                      </a:solidFill>
+                      <a:prstDash val="solid"/>
+                      <a:round/>
+                      <a:headEnd type="none" w="med" len="med"/>
+                      <a:tailEnd type="none" w="med" len="med"/>
+                    </a:lnL>
+                    <a:lnR w="7620" cap="flat" cmpd="sng" algn="ctr">
+                      <a:solidFill>
+                        <a:srgbClr val="DFE2E5"/>
+                      </a:solidFill>
+                      <a:prstDash val="solid"/>
+                      <a:round/>
+                      <a:headEnd type="none" w="med" len="med"/>
+                      <a:tailEnd type="none" w="med" len="med"/>
+                    </a:lnR>
+                    <a:lnT w="7620" cap="flat" cmpd="sng" algn="ctr">
+                      <a:solidFill>
+                        <a:srgbClr val="DFE2E5"/>
+                      </a:solidFill>
+                      <a:prstDash val="solid"/>
+                      <a:round/>
+                      <a:headEnd type="none" w="med" len="med"/>
+                      <a:tailEnd type="none" w="med" len="med"/>
+                    </a:lnT>
+                    <a:lnB w="7620" cap="flat" cmpd="sng" algn="ctr">
+                      <a:solidFill>
+                        <a:srgbClr val="DFE2E5"/>
+                      </a:solidFill>
+                      <a:prstDash val="solid"/>
+                      <a:round/>
+                      <a:headEnd type="none" w="med" len="med"/>
+                      <a:tailEnd type="none" w="med" len="med"/>
+                    </a:lnB>
+                    <a:solidFill>
+                      <a:srgbClr val="FFFFFF"/>
+                    </a:solidFill>
+                  </a:tcPr>
+                </a:tc>
+                <a:extLst>
+                  <a:ext uri="{0D108BD9-81ED-4DB2-BD59-A6C34878D82A}">
+                    <a16:rowId xmlns:a16="http://schemas.microsoft.com/office/drawing/2014/main" val="2734542940"/>
+                  </a:ext>
+                </a:extLst>
+              </a:tr>
+              <a:tr h="2221528">
+                <a:tc>
+                  <a:txBody>
+                    <a:bodyPr/>
+                    <a:lstStyle/>
+                    <a:p>
+                      <a:r>
+                        <a:rPr lang="en-US" sz="1600" dirty="0">
+                          <a:effectLst/>
+                        </a:rPr>
+                        <a:t>MOUD</a:t>
+                      </a:r>
+                    </a:p>
+                  </a:txBody>
+                  <a:tcPr marL="38016" marR="38016" marT="17546" marB="17546" anchor="ctr">
+                    <a:lnL w="7620" cap="flat" cmpd="sng" algn="ctr">
+                      <a:solidFill>
+                        <a:srgbClr val="DFE2E5"/>
+                      </a:solidFill>
+                      <a:prstDash val="solid"/>
+                      <a:round/>
+                      <a:headEnd type="none" w="med" len="med"/>
+                      <a:tailEnd type="none" w="med" len="med"/>
+                    </a:lnL>
+                    <a:lnR w="7620" cap="flat" cmpd="sng" algn="ctr">
+                      <a:solidFill>
+                        <a:srgbClr val="DFE2E5"/>
+                      </a:solidFill>
+                      <a:prstDash val="solid"/>
+                      <a:round/>
+                      <a:headEnd type="none" w="med" len="med"/>
+                      <a:tailEnd type="none" w="med" len="med"/>
+                    </a:lnR>
+                    <a:lnT w="7620" cap="flat" cmpd="sng" algn="ctr">
+                      <a:solidFill>
+                        <a:srgbClr val="DFE2E5"/>
+                      </a:solidFill>
+                      <a:prstDash val="solid"/>
+                      <a:round/>
+                      <a:headEnd type="none" w="med" len="med"/>
+                      <a:tailEnd type="none" w="med" len="med"/>
+                    </a:lnT>
+                    <a:lnB w="7620" cap="flat" cmpd="sng" algn="ctr">
+                      <a:solidFill>
+                        <a:srgbClr val="DFE2E5"/>
+                      </a:solidFill>
+                      <a:prstDash val="solid"/>
+                      <a:round/>
+                      <a:headEnd type="none" w="med" len="med"/>
+                      <a:tailEnd type="none" w="med" len="med"/>
+                    </a:lnB>
+                    <a:solidFill>
+                      <a:srgbClr val="F6F8FA"/>
+                    </a:solidFill>
+                  </a:tcPr>
+                </a:tc>
+                <a:tc>
+                  <a:txBody>
+                    <a:bodyPr/>
+                    <a:lstStyle/>
+                    <a:p>
+                      <a:r>
+                        <a:rPr lang="en-US" sz="1600" dirty="0">
+                          <a:effectLst/>
+                        </a:rPr>
+                        <a:t>Pérez-Rosas, </a:t>
+                      </a:r>
+                      <a:r>
+                        <a:rPr lang="en-US" sz="1600" dirty="0" err="1">
+                          <a:effectLst/>
+                        </a:rPr>
+                        <a:t>Verónica</a:t>
+                      </a:r>
+                      <a:r>
+                        <a:rPr lang="en-US" sz="1600" dirty="0">
+                          <a:effectLst/>
+                        </a:rPr>
+                        <a:t>, Rada </a:t>
+                      </a:r>
+                      <a:r>
+                        <a:rPr lang="en-US" sz="1600" dirty="0" err="1">
+                          <a:effectLst/>
+                        </a:rPr>
+                        <a:t>Mihalcea</a:t>
+                      </a:r>
+                      <a:r>
+                        <a:rPr lang="en-US" sz="1600" dirty="0">
+                          <a:effectLst/>
+                        </a:rPr>
+                        <a:t>, and Louis-Philippe </a:t>
+                      </a:r>
+                      <a:r>
+                        <a:rPr lang="en-US" sz="1600" dirty="0" err="1">
+                          <a:effectLst/>
+                        </a:rPr>
+                        <a:t>Morency</a:t>
+                      </a:r>
+                      <a:r>
+                        <a:rPr lang="en-US" sz="1600" dirty="0">
+                          <a:effectLst/>
+                        </a:rPr>
+                        <a:t>. "Utterance-level multimodal sentiment analysis." Proceedings of the 51st Annual Meeting of the Association for Computational Linguistics (Volume 1: Long Papers). Vol. 1. 2013.</a:t>
+                      </a:r>
+                    </a:p>
+                  </a:txBody>
+                  <a:tcPr marL="38016" marR="38016" marT="17546" marB="17546" anchor="ctr">
+                    <a:lnL w="7620" cap="flat" cmpd="sng" algn="ctr">
+                      <a:solidFill>
+                        <a:srgbClr val="DFE2E5"/>
+                      </a:solidFill>
+                      <a:prstDash val="solid"/>
+                      <a:round/>
+                      <a:headEnd type="none" w="med" len="med"/>
+                      <a:tailEnd type="none" w="med" len="med"/>
+                    </a:lnL>
+                    <a:lnR w="7620" cap="flat" cmpd="sng" algn="ctr">
+                      <a:solidFill>
+                        <a:srgbClr val="DFE2E5"/>
+                      </a:solidFill>
+                      <a:prstDash val="solid"/>
+                      <a:round/>
+                      <a:headEnd type="none" w="med" len="med"/>
+                      <a:tailEnd type="none" w="med" len="med"/>
+                    </a:lnR>
+                    <a:lnT w="7620" cap="flat" cmpd="sng" algn="ctr">
+                      <a:solidFill>
+                        <a:srgbClr val="DFE2E5"/>
+                      </a:solidFill>
+                      <a:prstDash val="solid"/>
+                      <a:round/>
+                      <a:headEnd type="none" w="med" len="med"/>
+                      <a:tailEnd type="none" w="med" len="med"/>
+                    </a:lnT>
+                    <a:lnB w="7620" cap="flat" cmpd="sng" algn="ctr">
+                      <a:solidFill>
+                        <a:srgbClr val="DFE2E5"/>
+                      </a:solidFill>
+                      <a:prstDash val="solid"/>
+                      <a:round/>
+                      <a:headEnd type="none" w="med" len="med"/>
+                      <a:tailEnd type="none" w="med" len="med"/>
+                    </a:lnB>
+                    <a:solidFill>
+                      <a:srgbClr val="F6F8FA"/>
+                    </a:solidFill>
+                  </a:tcPr>
+                </a:tc>
+                <a:extLst>
+                  <a:ext uri="{0D108BD9-81ED-4DB2-BD59-A6C34878D82A}">
+                    <a16:rowId xmlns:a16="http://schemas.microsoft.com/office/drawing/2014/main" val="1136339601"/>
+                  </a:ext>
+                </a:extLst>
+              </a:tr>
+            </a:tbl>
+          </a:graphicData>
+        </a:graphic>
+      </p:graphicFrame>
+    </p:spTree>
+    <p:extLst>
+      <p:ext uri="{BB962C8B-B14F-4D97-AF65-F5344CB8AC3E}">
+        <p14:creationId xmlns:p14="http://schemas.microsoft.com/office/powerpoint/2010/main" val="3679985965"/>
+      </p:ext>
+    </p:extLst>
+  </p:cSld>
+  <p:clrMapOvr>
+    <a:masterClrMapping/>
+  </p:clrMapOvr>
+</p:sld>
+</file>
+
 <file path=ppt/theme/theme1.xml><?xml version="1.0" encoding="utf-8"?>
 <a:theme xmlns:a="http://schemas.openxmlformats.org/drawingml/2006/main" name="Office 主题​​">
   <a:themeElements>

</xml_diff>